<commit_message>
Actually actually finished presentation + made pdf of it
</commit_message>
<xml_diff>
--- a/doc/presentations/TeamLead1.pptx
+++ b/doc/presentations/TeamLead1.pptx
@@ -6,9 +6,11 @@
   </p:sldMasterIdLst>
   <p:sldIdLst>
     <p:sldId id="256" r:id="rId2"/>
-    <p:sldId id="259" r:id="rId3"/>
-    <p:sldId id="260" r:id="rId4"/>
-    <p:sldId id="261" r:id="rId5"/>
+    <p:sldId id="262" r:id="rId3"/>
+    <p:sldId id="263" r:id="rId4"/>
+    <p:sldId id="259" r:id="rId5"/>
+    <p:sldId id="260" r:id="rId6"/>
+    <p:sldId id="261" r:id="rId7"/>
   </p:sldIdLst>
   <p:sldSz cx="12192000" cy="6858000"/>
   <p:notesSz cx="6858000" cy="9144000"/>
@@ -6040,7 +6042,7 @@
           <p:cNvPr id="2" name="Title 1">
             <a:extLst>
               <a:ext uri="{FF2B5EF4-FFF2-40B4-BE49-F238E27FC236}">
-                <a16:creationId xmlns:a16="http://schemas.microsoft.com/office/drawing/2014/main" id="{428BBBA5-6DD6-4F08-975B-DA1217941D6F}"/>
+                <a16:creationId xmlns:a16="http://schemas.microsoft.com/office/drawing/2014/main" id="{31F0C231-36A1-4D03-8A30-A233AB9E8B8D}"/>
               </a:ext>
             </a:extLst>
           </p:cNvPr>
@@ -6058,7 +6060,7 @@
           <a:p>
             <a:r>
               <a:rPr lang="en-US" dirty="0"/>
-              <a:t>Dungeon Jump</a:t>
+              <a:t>Git directory structure</a:t>
             </a:r>
           </a:p>
         </p:txBody>
@@ -6068,7 +6070,7 @@
           <p:cNvPr id="3" name="Content Placeholder 2">
             <a:extLst>
               <a:ext uri="{FF2B5EF4-FFF2-40B4-BE49-F238E27FC236}">
-                <a16:creationId xmlns:a16="http://schemas.microsoft.com/office/drawing/2014/main" id="{F91CA773-4366-43CA-9AF0-354C03998520}"/>
+                <a16:creationId xmlns:a16="http://schemas.microsoft.com/office/drawing/2014/main" id="{B6D0C4C0-DECA-47CA-A424-8707C09BB80B}"/>
               </a:ext>
             </a:extLst>
           </p:cNvPr>
@@ -6086,50 +6088,15 @@
           <a:p>
             <a:r>
               <a:rPr lang="en-US" dirty="0"/>
-              <a:t>2D top down/platformer hybrid</a:t>
-            </a:r>
-          </a:p>
-          <a:p>
-            <a:r>
-              <a:rPr lang="en-US" dirty="0"/>
-              <a:t>RPG</a:t>
-            </a:r>
-          </a:p>
-          <a:p>
-            <a:pPr lvl="1"/>
-            <a:r>
-              <a:rPr lang="en-US" dirty="0"/>
-              <a:t>HP</a:t>
-            </a:r>
-          </a:p>
-          <a:p>
-            <a:pPr lvl="1"/>
-            <a:r>
-              <a:rPr lang="en-US" dirty="0"/>
-              <a:t>Items</a:t>
-            </a:r>
-          </a:p>
-          <a:p>
-            <a:pPr lvl="1"/>
-            <a:r>
-              <a:rPr lang="en-US" dirty="0"/>
-              <a:t>Quests</a:t>
-            </a:r>
-          </a:p>
-          <a:p>
-            <a:pPr lvl="1"/>
-            <a:endParaRPr lang="en-US" dirty="0"/>
-          </a:p>
-          <a:p>
-            <a:pPr lvl="1"/>
-            <a:endParaRPr lang="en-US" dirty="0"/>
+              <a:t>To be demonstrated</a:t>
+            </a:r>
           </a:p>
         </p:txBody>
       </p:sp>
     </p:spTree>
     <p:extLst>
       <p:ext uri="{BB962C8B-B14F-4D97-AF65-F5344CB8AC3E}">
-        <p14:creationId xmlns:p14="http://schemas.microsoft.com/office/powerpoint/2010/main" val="1356696368"/>
+        <p14:creationId xmlns:p14="http://schemas.microsoft.com/office/powerpoint/2010/main" val="2137051432"/>
       </p:ext>
     </p:extLst>
   </p:cSld>
@@ -6161,6 +6128,242 @@
           <p:cNvPr id="2" name="Title 1">
             <a:extLst>
               <a:ext uri="{FF2B5EF4-FFF2-40B4-BE49-F238E27FC236}">
+                <a16:creationId xmlns:a16="http://schemas.microsoft.com/office/drawing/2014/main" id="{3432A596-3371-45B3-AB0A-C758982374EB}"/>
+              </a:ext>
+            </a:extLst>
+          </p:cNvPr>
+          <p:cNvSpPr>
+            <a:spLocks noGrp="1"/>
+          </p:cNvSpPr>
+          <p:nvPr>
+            <p:ph type="title"/>
+          </p:nvPr>
+        </p:nvSpPr>
+        <p:spPr/>
+        <p:txBody>
+          <a:bodyPr/>
+          <a:lstStyle/>
+          <a:p>
+            <a:r>
+              <a:rPr lang="en-US" dirty="0"/>
+              <a:t>Team member Git contributions</a:t>
+            </a:r>
+          </a:p>
+        </p:txBody>
+      </p:sp>
+      <p:sp>
+        <p:nvSpPr>
+          <p:cNvPr id="3" name="Content Placeholder 2">
+            <a:extLst>
+              <a:ext uri="{FF2B5EF4-FFF2-40B4-BE49-F238E27FC236}">
+                <a16:creationId xmlns:a16="http://schemas.microsoft.com/office/drawing/2014/main" id="{95C60663-E77A-486C-BC7A-6677F6DF47F0}"/>
+              </a:ext>
+            </a:extLst>
+          </p:cNvPr>
+          <p:cNvSpPr>
+            <a:spLocks noGrp="1"/>
+          </p:cNvSpPr>
+          <p:nvPr>
+            <p:ph idx="1"/>
+          </p:nvPr>
+        </p:nvSpPr>
+        <p:spPr/>
+        <p:txBody>
+          <a:bodyPr/>
+          <a:lstStyle/>
+          <a:p>
+            <a:r>
+              <a:rPr lang="en-US" dirty="0"/>
+              <a:t>To be demonstrated</a:t>
+            </a:r>
+          </a:p>
+          <a:p>
+            <a:pPr lvl="1"/>
+            <a:r>
+              <a:rPr lang="en-US" dirty="0"/>
+              <a:t>/</a:t>
+            </a:r>
+            <a:r>
+              <a:rPr lang="en-US" dirty="0" err="1"/>
+              <a:t>src</a:t>
+            </a:r>
+            <a:r>
+              <a:rPr lang="en-US" dirty="0"/>
+              <a:t> readme</a:t>
+            </a:r>
+          </a:p>
+          <a:p>
+            <a:pPr lvl="1"/>
+            <a:r>
+              <a:rPr lang="en-US" dirty="0"/>
+              <a:t>/doc Git manual</a:t>
+            </a:r>
+          </a:p>
+          <a:p>
+            <a:pPr lvl="1"/>
+            <a:r>
+              <a:rPr lang="en-US" dirty="0"/>
+              <a:t>/doc Champion documents</a:t>
+            </a:r>
+          </a:p>
+        </p:txBody>
+      </p:sp>
+    </p:spTree>
+    <p:extLst>
+      <p:ext uri="{BB962C8B-B14F-4D97-AF65-F5344CB8AC3E}">
+        <p14:creationId xmlns:p14="http://schemas.microsoft.com/office/powerpoint/2010/main" val="4233043282"/>
+      </p:ext>
+    </p:extLst>
+  </p:cSld>
+  <p:clrMapOvr>
+    <a:masterClrMapping/>
+  </p:clrMapOvr>
+</p:sld>
+</file>
+
+<file path=ppt/slides/slide4.xml><?xml version="1.0" encoding="utf-8"?>
+<p:sld xmlns:a="http://schemas.openxmlformats.org/drawingml/2006/main" xmlns:r="http://schemas.openxmlformats.org/officeDocument/2006/relationships" xmlns:p="http://schemas.openxmlformats.org/presentationml/2006/main">
+  <p:cSld>
+    <p:spTree>
+      <p:nvGrpSpPr>
+        <p:cNvPr id="1" name=""/>
+        <p:cNvGrpSpPr/>
+        <p:nvPr/>
+      </p:nvGrpSpPr>
+      <p:grpSpPr>
+        <a:xfrm>
+          <a:off x="0" y="0"/>
+          <a:ext cx="0" cy="0"/>
+          <a:chOff x="0" y="0"/>
+          <a:chExt cx="0" cy="0"/>
+        </a:xfrm>
+      </p:grpSpPr>
+      <p:sp>
+        <p:nvSpPr>
+          <p:cNvPr id="2" name="Title 1">
+            <a:extLst>
+              <a:ext uri="{FF2B5EF4-FFF2-40B4-BE49-F238E27FC236}">
+                <a16:creationId xmlns:a16="http://schemas.microsoft.com/office/drawing/2014/main" id="{428BBBA5-6DD6-4F08-975B-DA1217941D6F}"/>
+              </a:ext>
+            </a:extLst>
+          </p:cNvPr>
+          <p:cNvSpPr>
+            <a:spLocks noGrp="1"/>
+          </p:cNvSpPr>
+          <p:nvPr>
+            <p:ph type="title"/>
+          </p:nvPr>
+        </p:nvSpPr>
+        <p:spPr/>
+        <p:txBody>
+          <a:bodyPr/>
+          <a:lstStyle/>
+          <a:p>
+            <a:r>
+              <a:rPr lang="en-US" dirty="0"/>
+              <a:t>Dungeon Jump</a:t>
+            </a:r>
+          </a:p>
+        </p:txBody>
+      </p:sp>
+      <p:sp>
+        <p:nvSpPr>
+          <p:cNvPr id="3" name="Content Placeholder 2">
+            <a:extLst>
+              <a:ext uri="{FF2B5EF4-FFF2-40B4-BE49-F238E27FC236}">
+                <a16:creationId xmlns:a16="http://schemas.microsoft.com/office/drawing/2014/main" id="{F91CA773-4366-43CA-9AF0-354C03998520}"/>
+              </a:ext>
+            </a:extLst>
+          </p:cNvPr>
+          <p:cNvSpPr>
+            <a:spLocks noGrp="1"/>
+          </p:cNvSpPr>
+          <p:nvPr>
+            <p:ph idx="1"/>
+          </p:nvPr>
+        </p:nvSpPr>
+        <p:spPr/>
+        <p:txBody>
+          <a:bodyPr/>
+          <a:lstStyle/>
+          <a:p>
+            <a:r>
+              <a:rPr lang="en-US" dirty="0"/>
+              <a:t>2D top down/platformer hybrid</a:t>
+            </a:r>
+          </a:p>
+          <a:p>
+            <a:r>
+              <a:rPr lang="en-US" dirty="0"/>
+              <a:t>RPG</a:t>
+            </a:r>
+          </a:p>
+          <a:p>
+            <a:pPr lvl="1"/>
+            <a:r>
+              <a:rPr lang="en-US" dirty="0"/>
+              <a:t>HP</a:t>
+            </a:r>
+          </a:p>
+          <a:p>
+            <a:pPr lvl="1"/>
+            <a:r>
+              <a:rPr lang="en-US" dirty="0"/>
+              <a:t>Items</a:t>
+            </a:r>
+          </a:p>
+          <a:p>
+            <a:pPr lvl="1"/>
+            <a:r>
+              <a:rPr lang="en-US" dirty="0"/>
+              <a:t>Quests</a:t>
+            </a:r>
+          </a:p>
+          <a:p>
+            <a:pPr lvl="1"/>
+            <a:endParaRPr lang="en-US" dirty="0"/>
+          </a:p>
+          <a:p>
+            <a:pPr lvl="1"/>
+            <a:endParaRPr lang="en-US" dirty="0"/>
+          </a:p>
+        </p:txBody>
+      </p:sp>
+    </p:spTree>
+    <p:extLst>
+      <p:ext uri="{BB962C8B-B14F-4D97-AF65-F5344CB8AC3E}">
+        <p14:creationId xmlns:p14="http://schemas.microsoft.com/office/powerpoint/2010/main" val="1356696368"/>
+      </p:ext>
+    </p:extLst>
+  </p:cSld>
+  <p:clrMapOvr>
+    <a:masterClrMapping/>
+  </p:clrMapOvr>
+</p:sld>
+</file>
+
+<file path=ppt/slides/slide5.xml><?xml version="1.0" encoding="utf-8"?>
+<p:sld xmlns:a="http://schemas.openxmlformats.org/drawingml/2006/main" xmlns:r="http://schemas.openxmlformats.org/officeDocument/2006/relationships" xmlns:p="http://schemas.openxmlformats.org/presentationml/2006/main">
+  <p:cSld>
+    <p:spTree>
+      <p:nvGrpSpPr>
+        <p:cNvPr id="1" name=""/>
+        <p:cNvGrpSpPr/>
+        <p:nvPr/>
+      </p:nvGrpSpPr>
+      <p:grpSpPr>
+        <a:xfrm>
+          <a:off x="0" y="0"/>
+          <a:ext cx="0" cy="0"/>
+          <a:chOff x="0" y="0"/>
+          <a:chExt cx="0" cy="0"/>
+        </a:xfrm>
+      </p:grpSpPr>
+      <p:sp>
+        <p:nvSpPr>
+          <p:cNvPr id="2" name="Title 1">
+            <a:extLst>
+              <a:ext uri="{FF2B5EF4-FFF2-40B4-BE49-F238E27FC236}">
                 <a16:creationId xmlns:a16="http://schemas.microsoft.com/office/drawing/2014/main" id="{1D961AA5-3C49-4D59-AA60-02DD873CE6B6}"/>
               </a:ext>
             </a:extLst>
@@ -6269,7 +6472,7 @@
 </p:sld>
 </file>
 
-<file path=ppt/slides/slide4.xml><?xml version="1.0" encoding="utf-8"?>
+<file path=ppt/slides/slide6.xml><?xml version="1.0" encoding="utf-8"?>
 <p:sld xmlns:a="http://schemas.openxmlformats.org/drawingml/2006/main" xmlns:r="http://schemas.openxmlformats.org/officeDocument/2006/relationships" xmlns:p="http://schemas.openxmlformats.org/presentationml/2006/main">
   <p:cSld>
     <p:spTree>

</xml_diff>